<commit_message>
feature/mojaru-v2: Individual buttons folder ready with writing and pronunciation images for all letters; button1.js ready with updated map structure; Necessary generic setup ready in code; Will have separate links for all the video and down buttons component render from writing home page and that will pass the necessary button render map; intro video landscape has to be made ready.
</commit_message>
<xml_diff>
--- a/Misc Files/mojaru - 2 - writing (1).pptx
+++ b/Misc Files/mojaru - 2 - writing (1).pptx
@@ -214,7 +214,7 @@
           <a:p>
             <a:fld id="{227B884D-47BD-4AF6-9A43-D950D981CF0D}" type="datetimeFigureOut">
               <a:rPr lang="en-US" smtClean="0"/>
-              <a:t>2/27/2022</a:t>
+              <a:t>3/1/2022</a:t>
             </a:fld>
             <a:endParaRPr lang="en-US"/>
           </a:p>
@@ -4764,7 +4764,7 @@
           <a:p>
             <a:fld id="{37D67B78-CFDB-4ECE-ADE6-BB76363CA169}" type="datetimeFigureOut">
               <a:rPr lang="en-US" smtClean="0"/>
-              <a:t>2/27/2022</a:t>
+              <a:t>3/1/2022</a:t>
             </a:fld>
             <a:endParaRPr lang="en-US"/>
           </a:p>
@@ -5031,7 +5031,7 @@
           <a:p>
             <a:fld id="{37D67B78-CFDB-4ECE-ADE6-BB76363CA169}" type="datetimeFigureOut">
               <a:rPr lang="en-US" smtClean="0"/>
-              <a:t>2/27/2022</a:t>
+              <a:t>3/1/2022</a:t>
             </a:fld>
             <a:endParaRPr lang="en-US"/>
           </a:p>
@@ -5227,7 +5227,7 @@
           <a:p>
             <a:fld id="{37D67B78-CFDB-4ECE-ADE6-BB76363CA169}" type="datetimeFigureOut">
               <a:rPr lang="en-US" smtClean="0"/>
-              <a:t>2/27/2022</a:t>
+              <a:t>3/1/2022</a:t>
             </a:fld>
             <a:endParaRPr lang="en-US"/>
           </a:p>
@@ -5490,7 +5490,7 @@
           <a:p>
             <a:fld id="{37D67B78-CFDB-4ECE-ADE6-BB76363CA169}" type="datetimeFigureOut">
               <a:rPr lang="en-US" smtClean="0"/>
-              <a:t>2/27/2022</a:t>
+              <a:t>3/1/2022</a:t>
             </a:fld>
             <a:endParaRPr lang="en-US"/>
           </a:p>
@@ -5924,7 +5924,7 @@
           <a:p>
             <a:fld id="{37D67B78-CFDB-4ECE-ADE6-BB76363CA169}" type="datetimeFigureOut">
               <a:rPr lang="en-US" smtClean="0"/>
-              <a:t>2/27/2022</a:t>
+              <a:t>3/1/2022</a:t>
             </a:fld>
             <a:endParaRPr lang="en-US"/>
           </a:p>
@@ -6470,7 +6470,7 @@
           <a:p>
             <a:fld id="{37D67B78-CFDB-4ECE-ADE6-BB76363CA169}" type="datetimeFigureOut">
               <a:rPr lang="en-US" smtClean="0"/>
-              <a:t>2/27/2022</a:t>
+              <a:t>3/1/2022</a:t>
             </a:fld>
             <a:endParaRPr lang="en-US"/>
           </a:p>
@@ -7190,7 +7190,7 @@
           <a:p>
             <a:fld id="{37D67B78-CFDB-4ECE-ADE6-BB76363CA169}" type="datetimeFigureOut">
               <a:rPr lang="en-US" smtClean="0"/>
-              <a:t>2/27/2022</a:t>
+              <a:t>3/1/2022</a:t>
             </a:fld>
             <a:endParaRPr lang="en-US"/>
           </a:p>
@@ -7360,7 +7360,7 @@
           <a:p>
             <a:fld id="{37D67B78-CFDB-4ECE-ADE6-BB76363CA169}" type="datetimeFigureOut">
               <a:rPr lang="en-US" smtClean="0"/>
-              <a:t>2/27/2022</a:t>
+              <a:t>3/1/2022</a:t>
             </a:fld>
             <a:endParaRPr lang="en-US"/>
           </a:p>
@@ -7540,7 +7540,7 @@
           <a:p>
             <a:fld id="{37D67B78-CFDB-4ECE-ADE6-BB76363CA169}" type="datetimeFigureOut">
               <a:rPr lang="en-US" smtClean="0"/>
-              <a:t>2/27/2022</a:t>
+              <a:t>3/1/2022</a:t>
             </a:fld>
             <a:endParaRPr lang="en-US"/>
           </a:p>
@@ -7710,7 +7710,7 @@
           <a:p>
             <a:fld id="{37D67B78-CFDB-4ECE-ADE6-BB76363CA169}" type="datetimeFigureOut">
               <a:rPr lang="en-US" smtClean="0"/>
-              <a:t>2/27/2022</a:t>
+              <a:t>3/1/2022</a:t>
             </a:fld>
             <a:endParaRPr lang="en-US"/>
           </a:p>
@@ -7960,7 +7960,7 @@
           <a:p>
             <a:fld id="{37D67B78-CFDB-4ECE-ADE6-BB76363CA169}" type="datetimeFigureOut">
               <a:rPr lang="en-US" smtClean="0"/>
-              <a:t>2/27/2022</a:t>
+              <a:t>3/1/2022</a:t>
             </a:fld>
             <a:endParaRPr lang="en-US"/>
           </a:p>
@@ -8192,7 +8192,7 @@
           <a:p>
             <a:fld id="{37D67B78-CFDB-4ECE-ADE6-BB76363CA169}" type="datetimeFigureOut">
               <a:rPr lang="en-US" smtClean="0"/>
-              <a:t>2/27/2022</a:t>
+              <a:t>3/1/2022</a:t>
             </a:fld>
             <a:endParaRPr lang="en-US"/>
           </a:p>
@@ -8578,7 +8578,7 @@
           <a:p>
             <a:fld id="{37D67B78-CFDB-4ECE-ADE6-BB76363CA169}" type="datetimeFigureOut">
               <a:rPr lang="en-US" smtClean="0"/>
-              <a:t>2/27/2022</a:t>
+              <a:t>3/1/2022</a:t>
             </a:fld>
             <a:endParaRPr lang="en-US"/>
           </a:p>
@@ -8701,7 +8701,7 @@
           <a:p>
             <a:fld id="{37D67B78-CFDB-4ECE-ADE6-BB76363CA169}" type="datetimeFigureOut">
               <a:rPr lang="en-US" smtClean="0"/>
-              <a:t>2/27/2022</a:t>
+              <a:t>3/1/2022</a:t>
             </a:fld>
             <a:endParaRPr lang="en-US"/>
           </a:p>
@@ -8796,7 +8796,7 @@
           <a:p>
             <a:fld id="{37D67B78-CFDB-4ECE-ADE6-BB76363CA169}" type="datetimeFigureOut">
               <a:rPr lang="en-US" smtClean="0"/>
-              <a:t>2/27/2022</a:t>
+              <a:t>3/1/2022</a:t>
             </a:fld>
             <a:endParaRPr lang="en-US"/>
           </a:p>
@@ -9045,7 +9045,7 @@
           <a:p>
             <a:fld id="{37D67B78-CFDB-4ECE-ADE6-BB76363CA169}" type="datetimeFigureOut">
               <a:rPr lang="en-US" smtClean="0"/>
-              <a:t>2/27/2022</a:t>
+              <a:t>3/1/2022</a:t>
             </a:fld>
             <a:endParaRPr lang="en-US"/>
           </a:p>
@@ -9330,7 +9330,7 @@
           <a:p>
             <a:fld id="{37D67B78-CFDB-4ECE-ADE6-BB76363CA169}" type="datetimeFigureOut">
               <a:rPr lang="en-US" smtClean="0"/>
-              <a:t>2/27/2022</a:t>
+              <a:t>3/1/2022</a:t>
             </a:fld>
             <a:endParaRPr lang="en-US"/>
           </a:p>
@@ -12414,7 +12414,7 @@
           <a:p>
             <a:fld id="{37D67B78-CFDB-4ECE-ADE6-BB76363CA169}" type="datetimeFigureOut">
               <a:rPr lang="en-US" smtClean="0"/>
-              <a:t>2/27/2022</a:t>
+              <a:t>3/1/2022</a:t>
             </a:fld>
             <a:endParaRPr lang="en-US"/>
           </a:p>
@@ -18844,7 +18844,7 @@
         </p:nvSpPr>
         <p:spPr>
           <a:xfrm>
-            <a:off x="2568564" y="2646523"/>
+            <a:off x="3018704" y="3120976"/>
             <a:ext cx="711536" cy="767322"/>
           </a:xfrm>
           <a:prstGeom prst="rect">
@@ -18899,15 +18899,10 @@
                 <a:solidFill>
                   <a:schemeClr val="bg1"/>
                 </a:solidFill>
-                <a:effectLst>
-                  <a:outerShdw sx="1000" sy="1000" algn="ctr" rotWithShape="0">
-                    <a:srgbClr val="000000"/>
-                  </a:outerShdw>
-                </a:effectLst>
                 <a:latin typeface="Kalpurush" panose="02000600000000000000" pitchFamily="2" charset="0"/>
                 <a:cs typeface="Kalpurush" panose="02000600000000000000" pitchFamily="2" charset="0"/>
               </a:rPr>
-              <a:t>ব</a:t>
+              <a:t>ঠ</a:t>
             </a:r>
             <a:endParaRPr lang="en-US" sz="4400" b="1" dirty="0">
               <a:solidFill>
@@ -19248,7 +19243,7 @@
           <p:nvPr/>
         </p:nvPicPr>
         <p:blipFill>
-          <a:blip r:embed="rId4">
+          <a:blip r:embed="rId2">
             <a:extLst>
               <a:ext uri="{28A0092B-C50C-407E-A947-70E740481C1C}">
                 <a14:useLocalDpi xmlns:a14="http://schemas.microsoft.com/office/drawing/2010/main" val="0"/>
@@ -19370,112 +19365,6 @@
           </a:p>
         </p:txBody>
       </p:sp>
-      <p:grpSp>
-        <p:nvGrpSpPr>
-          <p:cNvPr id="19" name="Group 18">
-            <a:extLst>
-              <a:ext uri="{FF2B5EF4-FFF2-40B4-BE49-F238E27FC236}">
-                <a16:creationId xmlns:a16="http://schemas.microsoft.com/office/drawing/2014/main" id="{97B15FC1-9C1B-4E1A-A2F1-84503BCC964D}"/>
-              </a:ext>
-            </a:extLst>
-          </p:cNvPr>
-          <p:cNvGrpSpPr/>
-          <p:nvPr/>
-        </p:nvGrpSpPr>
-        <p:grpSpPr>
-          <a:xfrm rot="5400000">
-            <a:off x="3349733" y="1261993"/>
-            <a:ext cx="5314443" cy="4303704"/>
-            <a:chOff x="2464357" y="418724"/>
-            <a:chExt cx="7554829" cy="5481260"/>
-          </a:xfrm>
-        </p:grpSpPr>
-        <p:pic>
-          <p:nvPicPr>
-            <p:cNvPr id="1052" name="Picture 28" descr="Daisy decorative frame vector clip art | Free SVG">
-              <a:extLst>
-                <a:ext uri="{FF2B5EF4-FFF2-40B4-BE49-F238E27FC236}">
-                  <a16:creationId xmlns:a16="http://schemas.microsoft.com/office/drawing/2014/main" id="{05318AAB-B5A5-48EA-B506-4606F8BD7795}"/>
-                </a:ext>
-              </a:extLst>
-            </p:cNvPr>
-            <p:cNvPicPr>
-              <a:picLocks noChangeAspect="1" noChangeArrowheads="1"/>
-            </p:cNvPicPr>
-            <p:nvPr/>
-          </p:nvPicPr>
-          <p:blipFill>
-            <a:blip r:embed="rId5">
-              <a:extLst>
-                <a:ext uri="{28A0092B-C50C-407E-A947-70E740481C1C}">
-                  <a14:useLocalDpi xmlns:a14="http://schemas.microsoft.com/office/drawing/2010/main" val="0"/>
-                </a:ext>
-              </a:extLst>
-            </a:blip>
-            <a:srcRect/>
-            <a:stretch>
-              <a:fillRect/>
-            </a:stretch>
-          </p:blipFill>
-          <p:spPr bwMode="auto">
-            <a:xfrm rot="16200000">
-              <a:off x="3501142" y="-618061"/>
-              <a:ext cx="5481260" cy="7554829"/>
-            </a:xfrm>
-            <a:prstGeom prst="rect">
-              <a:avLst/>
-            </a:prstGeom>
-            <a:noFill/>
-            <a:extLst>
-              <a:ext uri="{909E8E84-426E-40DD-AFC4-6F175D3DCCD1}">
-                <a14:hiddenFill xmlns:a14="http://schemas.microsoft.com/office/drawing/2010/main">
-                  <a:solidFill>
-                    <a:srgbClr val="FFFFFF"/>
-                  </a:solidFill>
-                </a14:hiddenFill>
-              </a:ext>
-            </a:extLst>
-          </p:spPr>
-        </p:pic>
-        <p:pic>
-          <p:nvPicPr>
-            <p:cNvPr id="13" name="cho">
-              <a:hlinkClick r:id="" action="ppaction://media"/>
-              <a:extLst>
-                <a:ext uri="{FF2B5EF4-FFF2-40B4-BE49-F238E27FC236}">
-                  <a16:creationId xmlns:a16="http://schemas.microsoft.com/office/drawing/2014/main" id="{F43C3607-AAA6-4053-ABA6-D7E03F362859}"/>
-                </a:ext>
-              </a:extLst>
-            </p:cNvPr>
-            <p:cNvPicPr>
-              <a:picLocks noChangeAspect="1"/>
-            </p:cNvPicPr>
-            <p:nvPr>
-              <a:videoFile r:link="rId2"/>
-              <p:extLst>
-                <p:ext uri="{DAA4B4D4-6D71-4841-9C94-3DE7FCFB9230}">
-                  <p14:media xmlns:p14="http://schemas.microsoft.com/office/powerpoint/2010/main" r:embed="rId1"/>
-                </p:ext>
-              </p:extLst>
-            </p:nvPr>
-          </p:nvPicPr>
-          <p:blipFill>
-            <a:blip r:embed="rId6"/>
-            <a:stretch>
-              <a:fillRect/>
-            </a:stretch>
-          </p:blipFill>
-          <p:spPr>
-            <a:xfrm rot="16200000">
-              <a:off x="3983991" y="73386"/>
-              <a:ext cx="4515561" cy="6020749"/>
-            </a:xfrm>
-            <a:prstGeom prst="rect">
-              <a:avLst/>
-            </a:prstGeom>
-          </p:spPr>
-        </p:pic>
-      </p:grpSp>
       <p:pic>
         <p:nvPicPr>
           <p:cNvPr id="5" name="Picture 2" descr="Color Tiles | Free Images at Clker.com - vector clip art online, royalty  free &amp; public domain">
@@ -19491,7 +19380,7 @@
           <p:nvPr/>
         </p:nvPicPr>
         <p:blipFill>
-          <a:blip r:embed="rId7">
+          <a:blip r:embed="rId3">
             <a:extLst>
               <a:ext uri="{28A0092B-C50C-407E-A947-70E740481C1C}">
                 <a14:useLocalDpi xmlns:a14="http://schemas.microsoft.com/office/drawing/2010/main" val="0"/>
@@ -19537,7 +19426,7 @@
         </p:nvSpPr>
         <p:spPr>
           <a:xfrm>
-            <a:off x="8733810" y="2646523"/>
+            <a:off x="5325522" y="1587158"/>
             <a:ext cx="711536" cy="767322"/>
           </a:xfrm>
           <a:prstGeom prst="rect">
@@ -19592,15 +19481,10 @@
                 <a:solidFill>
                   <a:schemeClr val="bg1"/>
                 </a:solidFill>
-                <a:effectLst>
-                  <a:outerShdw sx="1000" sy="1000" algn="ctr" rotWithShape="0">
-                    <a:srgbClr val="000000"/>
-                  </a:outerShdw>
-                </a:effectLst>
                 <a:latin typeface="Kalpurush" panose="02000600000000000000" pitchFamily="2" charset="0"/>
                 <a:cs typeface="Kalpurush" panose="02000600000000000000" pitchFamily="2" charset="0"/>
               </a:rPr>
-              <a:t>ব</a:t>
+              <a:t>শ</a:t>
             </a:r>
             <a:endParaRPr lang="en-US" sz="4400" b="1" dirty="0">
               <a:solidFill>
@@ -19632,7 +19516,7 @@
           <p:nvPr/>
         </p:nvPicPr>
         <p:blipFill>
-          <a:blip r:embed="rId8">
+          <a:blip r:embed="rId4">
             <a:extLst>
               <a:ext uri="{28A0092B-C50C-407E-A947-70E740481C1C}">
                 <a14:useLocalDpi xmlns:a14="http://schemas.microsoft.com/office/drawing/2010/main" val="0"/>
@@ -19646,7 +19530,7 @@
         </p:blipFill>
         <p:spPr bwMode="auto">
           <a:xfrm rot="1596075">
-            <a:off x="9211313" y="1875995"/>
+            <a:off x="5803025" y="816630"/>
             <a:ext cx="565506" cy="885140"/>
           </a:xfrm>
           <a:prstGeom prst="rect">
@@ -19679,7 +19563,7 @@
           <p:nvPr/>
         </p:nvPicPr>
         <p:blipFill rotWithShape="1">
-          <a:blip r:embed="rId9">
+          <a:blip r:embed="rId5">
             <a:extLst>
               <a:ext uri="{28A0092B-C50C-407E-A947-70E740481C1C}">
                 <a14:useLocalDpi xmlns:a14="http://schemas.microsoft.com/office/drawing/2010/main" val="0"/>
@@ -19691,8 +19575,1358 @@
         </p:blipFill>
         <p:spPr bwMode="auto">
           <a:xfrm rot="221702">
-            <a:off x="2333096" y="2056456"/>
+            <a:off x="2783236" y="2530909"/>
             <a:ext cx="617662" cy="643190"/>
+          </a:xfrm>
+          <a:prstGeom prst="rect">
+            <a:avLst/>
+          </a:prstGeom>
+          <a:noFill/>
+          <a:extLst>
+            <a:ext uri="{909E8E84-426E-40DD-AFC4-6F175D3DCCD1}">
+              <a14:hiddenFill xmlns:a14="http://schemas.microsoft.com/office/drawing/2010/main">
+                <a:solidFill>
+                  <a:srgbClr val="FFFFFF"/>
+                </a:solidFill>
+              </a14:hiddenFill>
+            </a:ext>
+          </a:extLst>
+        </p:spPr>
+      </p:pic>
+      <p:sp>
+        <p:nvSpPr>
+          <p:cNvPr id="30" name="Rectangle 29">
+            <a:extLst>
+              <a:ext uri="{FF2B5EF4-FFF2-40B4-BE49-F238E27FC236}">
+                <a16:creationId xmlns:a16="http://schemas.microsoft.com/office/drawing/2014/main" id="{2E5FFDD1-C262-49B6-8FD7-8BCEA9D73339}"/>
+              </a:ext>
+            </a:extLst>
+          </p:cNvPr>
+          <p:cNvSpPr/>
+          <p:nvPr/>
+        </p:nvSpPr>
+        <p:spPr>
+          <a:xfrm>
+            <a:off x="884560" y="1950343"/>
+            <a:ext cx="711536" cy="767322"/>
+          </a:xfrm>
+          <a:prstGeom prst="rect">
+            <a:avLst/>
+          </a:prstGeom>
+          <a:ln>
+            <a:noFill/>
+          </a:ln>
+          <a:effectLst>
+            <a:outerShdw blurRad="190500" dist="190500" dir="3000000" algn="l" rotWithShape="0">
+              <a:prstClr val="black">
+                <a:alpha val="40000"/>
+              </a:prstClr>
+            </a:outerShdw>
+          </a:effectLst>
+          <a:scene3d>
+            <a:camera prst="orthographicFront"/>
+            <a:lightRig rig="threePt" dir="t"/>
+          </a:scene3d>
+          <a:sp3d>
+            <a:bevelT w="228600" h="69850"/>
+            <a:bevelB w="152400" h="50800" prst="softRound"/>
+          </a:sp3d>
+        </p:spPr>
+        <p:style>
+          <a:lnRef idx="2">
+            <a:schemeClr val="accent1">
+              <a:shade val="50000"/>
+            </a:schemeClr>
+          </a:lnRef>
+          <a:fillRef idx="1">
+            <a:schemeClr val="accent1"/>
+          </a:fillRef>
+          <a:effectRef idx="0">
+            <a:schemeClr val="accent1"/>
+          </a:effectRef>
+          <a:fontRef idx="minor">
+            <a:schemeClr val="lt1"/>
+          </a:fontRef>
+        </p:style>
+        <p:txBody>
+          <a:bodyPr rtlCol="0" anchor="ctr">
+            <a:sp3d>
+              <a:bevelB w="69850" prst="coolSlant"/>
+            </a:sp3d>
+          </a:bodyPr>
+          <a:lstStyle/>
+          <a:p>
+            <a:pPr algn="ctr"/>
+            <a:r>
+              <a:rPr lang="bn-IN" sz="4400" b="1" dirty="0">
+                <a:solidFill>
+                  <a:schemeClr val="bg1"/>
+                </a:solidFill>
+                <a:latin typeface="Kalpurush" panose="02000600000000000000" pitchFamily="2" charset="0"/>
+                <a:cs typeface="Kalpurush" panose="02000600000000000000" pitchFamily="2" charset="0"/>
+              </a:rPr>
+              <a:t>জ</a:t>
+            </a:r>
+            <a:endParaRPr lang="en-US" sz="4400" b="1" dirty="0">
+              <a:solidFill>
+                <a:schemeClr val="bg1"/>
+              </a:solidFill>
+              <a:effectLst>
+                <a:outerShdw sx="1000" sy="1000" algn="ctr" rotWithShape="0">
+                  <a:srgbClr val="000000"/>
+                </a:outerShdw>
+              </a:effectLst>
+              <a:latin typeface="Kalpurush" panose="02000600000000000000" pitchFamily="2" charset="0"/>
+              <a:cs typeface="Kalpurush" panose="02000600000000000000" pitchFamily="2" charset="0"/>
+            </a:endParaRPr>
+          </a:p>
+        </p:txBody>
+      </p:sp>
+      <p:pic>
+        <p:nvPicPr>
+          <p:cNvPr id="31" name="Picture 2" descr="Singing bird mascot image | Free SVG">
+            <a:extLst>
+              <a:ext uri="{FF2B5EF4-FFF2-40B4-BE49-F238E27FC236}">
+                <a16:creationId xmlns:a16="http://schemas.microsoft.com/office/drawing/2014/main" id="{A0A81DC8-AD72-4017-90D7-3F52AD5075B0}"/>
+              </a:ext>
+            </a:extLst>
+          </p:cNvPr>
+          <p:cNvPicPr>
+            <a:picLocks noChangeAspect="1" noChangeArrowheads="1"/>
+          </p:cNvPicPr>
+          <p:nvPr/>
+        </p:nvPicPr>
+        <p:blipFill rotWithShape="1">
+          <a:blip r:embed="rId5">
+            <a:extLst>
+              <a:ext uri="{28A0092B-C50C-407E-A947-70E740481C1C}">
+                <a14:useLocalDpi xmlns:a14="http://schemas.microsoft.com/office/drawing/2010/main" val="0"/>
+              </a:ext>
+            </a:extLst>
+          </a:blip>
+          <a:srcRect t="19279" r="43348" b="21728"/>
+          <a:stretch/>
+        </p:blipFill>
+        <p:spPr bwMode="auto">
+          <a:xfrm rot="221702">
+            <a:off x="649092" y="1360276"/>
+            <a:ext cx="617662" cy="643190"/>
+          </a:xfrm>
+          <a:prstGeom prst="rect">
+            <a:avLst/>
+          </a:prstGeom>
+          <a:noFill/>
+          <a:extLst>
+            <a:ext uri="{909E8E84-426E-40DD-AFC4-6F175D3DCCD1}">
+              <a14:hiddenFill xmlns:a14="http://schemas.microsoft.com/office/drawing/2010/main">
+                <a:solidFill>
+                  <a:srgbClr val="FFFFFF"/>
+                </a:solidFill>
+              </a14:hiddenFill>
+            </a:ext>
+          </a:extLst>
+        </p:spPr>
+      </p:pic>
+      <p:sp>
+        <p:nvSpPr>
+          <p:cNvPr id="32" name="Rectangle 31">
+            <a:extLst>
+              <a:ext uri="{FF2B5EF4-FFF2-40B4-BE49-F238E27FC236}">
+                <a16:creationId xmlns:a16="http://schemas.microsoft.com/office/drawing/2014/main" id="{A26D75C2-9453-44E0-8F50-876034876706}"/>
+              </a:ext>
+            </a:extLst>
+          </p:cNvPr>
+          <p:cNvSpPr/>
+          <p:nvPr/>
+        </p:nvSpPr>
+        <p:spPr>
+          <a:xfrm>
+            <a:off x="771022" y="4023146"/>
+            <a:ext cx="711536" cy="767322"/>
+          </a:xfrm>
+          <a:prstGeom prst="rect">
+            <a:avLst/>
+          </a:prstGeom>
+          <a:ln>
+            <a:noFill/>
+          </a:ln>
+          <a:effectLst>
+            <a:outerShdw blurRad="190500" dist="190500" dir="3000000" algn="l" rotWithShape="0">
+              <a:prstClr val="black">
+                <a:alpha val="40000"/>
+              </a:prstClr>
+            </a:outerShdw>
+          </a:effectLst>
+          <a:scene3d>
+            <a:camera prst="orthographicFront"/>
+            <a:lightRig rig="threePt" dir="t"/>
+          </a:scene3d>
+          <a:sp3d>
+            <a:bevelT w="228600" h="69850"/>
+            <a:bevelB w="152400" h="50800" prst="softRound"/>
+          </a:sp3d>
+        </p:spPr>
+        <p:style>
+          <a:lnRef idx="2">
+            <a:schemeClr val="accent1">
+              <a:shade val="50000"/>
+            </a:schemeClr>
+          </a:lnRef>
+          <a:fillRef idx="1">
+            <a:schemeClr val="accent1"/>
+          </a:fillRef>
+          <a:effectRef idx="0">
+            <a:schemeClr val="accent1"/>
+          </a:effectRef>
+          <a:fontRef idx="minor">
+            <a:schemeClr val="lt1"/>
+          </a:fontRef>
+        </p:style>
+        <p:txBody>
+          <a:bodyPr rtlCol="0" anchor="ctr">
+            <a:sp3d>
+              <a:bevelB w="69850" prst="coolSlant"/>
+            </a:sp3d>
+          </a:bodyPr>
+          <a:lstStyle/>
+          <a:p>
+            <a:pPr algn="ctr"/>
+            <a:r>
+              <a:rPr lang="en-US" sz="4400" b="1" dirty="0">
+                <a:solidFill>
+                  <a:schemeClr val="bg1"/>
+                </a:solidFill>
+                <a:latin typeface="Kalpurush" panose="02000600000000000000" pitchFamily="2" charset="0"/>
+                <a:cs typeface="Kalpurush" panose="02000600000000000000" pitchFamily="2" charset="0"/>
+              </a:rPr>
+              <a:t>য়</a:t>
+            </a:r>
+            <a:endParaRPr lang="en-US" sz="4400" b="1" dirty="0">
+              <a:solidFill>
+                <a:schemeClr val="bg1"/>
+              </a:solidFill>
+              <a:effectLst>
+                <a:outerShdw sx="1000" sy="1000" algn="ctr" rotWithShape="0">
+                  <a:srgbClr val="000000"/>
+                </a:outerShdw>
+              </a:effectLst>
+              <a:latin typeface="Kalpurush" panose="02000600000000000000" pitchFamily="2" charset="0"/>
+              <a:cs typeface="Kalpurush" panose="02000600000000000000" pitchFamily="2" charset="0"/>
+            </a:endParaRPr>
+          </a:p>
+        </p:txBody>
+      </p:sp>
+      <p:pic>
+        <p:nvPicPr>
+          <p:cNvPr id="33" name="Picture 2" descr="Singing bird mascot image | Free SVG">
+            <a:extLst>
+              <a:ext uri="{FF2B5EF4-FFF2-40B4-BE49-F238E27FC236}">
+                <a16:creationId xmlns:a16="http://schemas.microsoft.com/office/drawing/2014/main" id="{C198A8F5-C6F4-4AF4-9FCD-B84002063B41}"/>
+              </a:ext>
+            </a:extLst>
+          </p:cNvPr>
+          <p:cNvPicPr>
+            <a:picLocks noChangeAspect="1" noChangeArrowheads="1"/>
+          </p:cNvPicPr>
+          <p:nvPr/>
+        </p:nvPicPr>
+        <p:blipFill rotWithShape="1">
+          <a:blip r:embed="rId5">
+            <a:extLst>
+              <a:ext uri="{28A0092B-C50C-407E-A947-70E740481C1C}">
+                <a14:useLocalDpi xmlns:a14="http://schemas.microsoft.com/office/drawing/2010/main" val="0"/>
+              </a:ext>
+            </a:extLst>
+          </a:blip>
+          <a:srcRect t="19279" r="43348" b="21728"/>
+          <a:stretch/>
+        </p:blipFill>
+        <p:spPr bwMode="auto">
+          <a:xfrm rot="221702">
+            <a:off x="535554" y="3433079"/>
+            <a:ext cx="617662" cy="643190"/>
+          </a:xfrm>
+          <a:prstGeom prst="rect">
+            <a:avLst/>
+          </a:prstGeom>
+          <a:noFill/>
+          <a:extLst>
+            <a:ext uri="{909E8E84-426E-40DD-AFC4-6F175D3DCCD1}">
+              <a14:hiddenFill xmlns:a14="http://schemas.microsoft.com/office/drawing/2010/main">
+                <a:solidFill>
+                  <a:srgbClr val="FFFFFF"/>
+                </a:solidFill>
+              </a14:hiddenFill>
+            </a:ext>
+          </a:extLst>
+        </p:spPr>
+      </p:pic>
+      <p:sp>
+        <p:nvSpPr>
+          <p:cNvPr id="34" name="Rectangle 33">
+            <a:extLst>
+              <a:ext uri="{FF2B5EF4-FFF2-40B4-BE49-F238E27FC236}">
+                <a16:creationId xmlns:a16="http://schemas.microsoft.com/office/drawing/2014/main" id="{FF50D497-ED98-4A5A-9EAD-68EE9739AE51}"/>
+              </a:ext>
+            </a:extLst>
+          </p:cNvPr>
+          <p:cNvSpPr/>
+          <p:nvPr/>
+        </p:nvSpPr>
+        <p:spPr>
+          <a:xfrm>
+            <a:off x="4563581" y="4972475"/>
+            <a:ext cx="711536" cy="767322"/>
+          </a:xfrm>
+          <a:prstGeom prst="rect">
+            <a:avLst/>
+          </a:prstGeom>
+          <a:ln>
+            <a:noFill/>
+          </a:ln>
+          <a:effectLst>
+            <a:outerShdw blurRad="190500" dist="190500" dir="3000000" algn="l" rotWithShape="0">
+              <a:prstClr val="black">
+                <a:alpha val="40000"/>
+              </a:prstClr>
+            </a:outerShdw>
+          </a:effectLst>
+          <a:scene3d>
+            <a:camera prst="orthographicFront"/>
+            <a:lightRig rig="threePt" dir="t"/>
+          </a:scene3d>
+          <a:sp3d>
+            <a:bevelT w="228600" h="69850"/>
+            <a:bevelB w="152400" h="50800" prst="softRound"/>
+          </a:sp3d>
+        </p:spPr>
+        <p:style>
+          <a:lnRef idx="2">
+            <a:schemeClr val="accent1">
+              <a:shade val="50000"/>
+            </a:schemeClr>
+          </a:lnRef>
+          <a:fillRef idx="1">
+            <a:schemeClr val="accent1"/>
+          </a:fillRef>
+          <a:effectRef idx="0">
+            <a:schemeClr val="accent1"/>
+          </a:effectRef>
+          <a:fontRef idx="minor">
+            <a:schemeClr val="lt1"/>
+          </a:fontRef>
+        </p:style>
+        <p:txBody>
+          <a:bodyPr rtlCol="0" anchor="ctr">
+            <a:sp3d>
+              <a:bevelB w="69850" prst="coolSlant"/>
+            </a:sp3d>
+          </a:bodyPr>
+          <a:lstStyle/>
+          <a:p>
+            <a:pPr algn="ctr"/>
+            <a:r>
+              <a:rPr lang="as-IN" sz="4400" b="1" dirty="0">
+                <a:solidFill>
+                  <a:schemeClr val="bg1"/>
+                </a:solidFill>
+                <a:latin typeface="Kalpurush" panose="02000600000000000000" pitchFamily="2" charset="0"/>
+                <a:cs typeface="Kalpurush" panose="02000600000000000000" pitchFamily="2" charset="0"/>
+              </a:rPr>
+              <a:t>ৎ</a:t>
+            </a:r>
+            <a:endParaRPr lang="en-US" sz="4400" b="1" dirty="0">
+              <a:solidFill>
+                <a:schemeClr val="bg1"/>
+              </a:solidFill>
+              <a:effectLst>
+                <a:outerShdw sx="1000" sy="1000" algn="ctr" rotWithShape="0">
+                  <a:srgbClr val="000000"/>
+                </a:outerShdw>
+              </a:effectLst>
+              <a:latin typeface="Kalpurush" panose="02000600000000000000" pitchFamily="2" charset="0"/>
+              <a:cs typeface="Kalpurush" panose="02000600000000000000" pitchFamily="2" charset="0"/>
+            </a:endParaRPr>
+          </a:p>
+        </p:txBody>
+      </p:sp>
+      <p:pic>
+        <p:nvPicPr>
+          <p:cNvPr id="35" name="Picture 2" descr="Singing bird mascot image | Free SVG">
+            <a:extLst>
+              <a:ext uri="{FF2B5EF4-FFF2-40B4-BE49-F238E27FC236}">
+                <a16:creationId xmlns:a16="http://schemas.microsoft.com/office/drawing/2014/main" id="{51C2E839-5D26-4542-A1DF-D348C4B30392}"/>
+              </a:ext>
+            </a:extLst>
+          </p:cNvPr>
+          <p:cNvPicPr>
+            <a:picLocks noChangeAspect="1" noChangeArrowheads="1"/>
+          </p:cNvPicPr>
+          <p:nvPr/>
+        </p:nvPicPr>
+        <p:blipFill rotWithShape="1">
+          <a:blip r:embed="rId5">
+            <a:extLst>
+              <a:ext uri="{28A0092B-C50C-407E-A947-70E740481C1C}">
+                <a14:useLocalDpi xmlns:a14="http://schemas.microsoft.com/office/drawing/2010/main" val="0"/>
+              </a:ext>
+            </a:extLst>
+          </a:blip>
+          <a:srcRect t="19279" r="43348" b="21728"/>
+          <a:stretch/>
+        </p:blipFill>
+        <p:spPr bwMode="auto">
+          <a:xfrm rot="221702">
+            <a:off x="4328113" y="4382408"/>
+            <a:ext cx="617662" cy="643190"/>
+          </a:xfrm>
+          <a:prstGeom prst="rect">
+            <a:avLst/>
+          </a:prstGeom>
+          <a:noFill/>
+          <a:extLst>
+            <a:ext uri="{909E8E84-426E-40DD-AFC4-6F175D3DCCD1}">
+              <a14:hiddenFill xmlns:a14="http://schemas.microsoft.com/office/drawing/2010/main">
+                <a:solidFill>
+                  <a:srgbClr val="FFFFFF"/>
+                </a:solidFill>
+              </a14:hiddenFill>
+            </a:ext>
+          </a:extLst>
+        </p:spPr>
+      </p:pic>
+      <p:sp>
+        <p:nvSpPr>
+          <p:cNvPr id="36" name="Rectangle 35">
+            <a:extLst>
+              <a:ext uri="{FF2B5EF4-FFF2-40B4-BE49-F238E27FC236}">
+                <a16:creationId xmlns:a16="http://schemas.microsoft.com/office/drawing/2014/main" id="{6870CF9C-833B-4043-937B-933FD382A411}"/>
+              </a:ext>
+            </a:extLst>
+          </p:cNvPr>
+          <p:cNvSpPr/>
+          <p:nvPr/>
+        </p:nvSpPr>
+        <p:spPr>
+          <a:xfrm>
+            <a:off x="2823802" y="934708"/>
+            <a:ext cx="711536" cy="767322"/>
+          </a:xfrm>
+          <a:prstGeom prst="rect">
+            <a:avLst/>
+          </a:prstGeom>
+          <a:ln>
+            <a:noFill/>
+          </a:ln>
+          <a:effectLst>
+            <a:outerShdw blurRad="190500" dist="190500" dir="3000000" algn="l" rotWithShape="0">
+              <a:prstClr val="black">
+                <a:alpha val="40000"/>
+              </a:prstClr>
+            </a:outerShdw>
+          </a:effectLst>
+          <a:scene3d>
+            <a:camera prst="orthographicFront"/>
+            <a:lightRig rig="threePt" dir="t"/>
+          </a:scene3d>
+          <a:sp3d>
+            <a:bevelT w="228600" h="69850"/>
+            <a:bevelB w="152400" h="50800" prst="softRound"/>
+          </a:sp3d>
+        </p:spPr>
+        <p:style>
+          <a:lnRef idx="2">
+            <a:schemeClr val="accent1">
+              <a:shade val="50000"/>
+            </a:schemeClr>
+          </a:lnRef>
+          <a:fillRef idx="1">
+            <a:schemeClr val="accent1"/>
+          </a:fillRef>
+          <a:effectRef idx="0">
+            <a:schemeClr val="accent1"/>
+          </a:effectRef>
+          <a:fontRef idx="minor">
+            <a:schemeClr val="lt1"/>
+          </a:fontRef>
+        </p:style>
+        <p:txBody>
+          <a:bodyPr rtlCol="0" anchor="ctr">
+            <a:sp3d>
+              <a:bevelB w="69850" prst="coolSlant"/>
+            </a:sp3d>
+          </a:bodyPr>
+          <a:lstStyle/>
+          <a:p>
+            <a:pPr algn="ctr"/>
+            <a:r>
+              <a:rPr lang="bn-IN" sz="4400" b="1" dirty="0">
+                <a:solidFill>
+                  <a:schemeClr val="bg1"/>
+                </a:solidFill>
+                <a:latin typeface="Kalpurush" panose="02000600000000000000" pitchFamily="2" charset="0"/>
+                <a:cs typeface="Kalpurush" panose="02000600000000000000" pitchFamily="2" charset="0"/>
+              </a:rPr>
+              <a:t>শ</a:t>
+            </a:r>
+            <a:endParaRPr lang="en-US" sz="4400" b="1" dirty="0">
+              <a:solidFill>
+                <a:schemeClr val="bg1"/>
+              </a:solidFill>
+              <a:effectLst>
+                <a:outerShdw sx="1000" sy="1000" algn="ctr" rotWithShape="0">
+                  <a:srgbClr val="000000"/>
+                </a:outerShdw>
+              </a:effectLst>
+              <a:latin typeface="Kalpurush" panose="02000600000000000000" pitchFamily="2" charset="0"/>
+              <a:cs typeface="Kalpurush" panose="02000600000000000000" pitchFamily="2" charset="0"/>
+            </a:endParaRPr>
+          </a:p>
+        </p:txBody>
+      </p:sp>
+      <p:pic>
+        <p:nvPicPr>
+          <p:cNvPr id="37" name="Picture 2" descr="Singing bird mascot image | Free SVG">
+            <a:extLst>
+              <a:ext uri="{FF2B5EF4-FFF2-40B4-BE49-F238E27FC236}">
+                <a16:creationId xmlns:a16="http://schemas.microsoft.com/office/drawing/2014/main" id="{4EE76B7B-2AD8-4145-8ABD-223C32AEA80F}"/>
+              </a:ext>
+            </a:extLst>
+          </p:cNvPr>
+          <p:cNvPicPr>
+            <a:picLocks noChangeAspect="1" noChangeArrowheads="1"/>
+          </p:cNvPicPr>
+          <p:nvPr/>
+        </p:nvPicPr>
+        <p:blipFill rotWithShape="1">
+          <a:blip r:embed="rId5">
+            <a:extLst>
+              <a:ext uri="{28A0092B-C50C-407E-A947-70E740481C1C}">
+                <a14:useLocalDpi xmlns:a14="http://schemas.microsoft.com/office/drawing/2010/main" val="0"/>
+              </a:ext>
+            </a:extLst>
+          </a:blip>
+          <a:srcRect t="19279" r="43348" b="21728"/>
+          <a:stretch/>
+        </p:blipFill>
+        <p:spPr bwMode="auto">
+          <a:xfrm rot="221702">
+            <a:off x="2588334" y="344641"/>
+            <a:ext cx="617662" cy="643190"/>
+          </a:xfrm>
+          <a:prstGeom prst="rect">
+            <a:avLst/>
+          </a:prstGeom>
+          <a:noFill/>
+          <a:extLst>
+            <a:ext uri="{909E8E84-426E-40DD-AFC4-6F175D3DCCD1}">
+              <a14:hiddenFill xmlns:a14="http://schemas.microsoft.com/office/drawing/2010/main">
+                <a:solidFill>
+                  <a:srgbClr val="FFFFFF"/>
+                </a:solidFill>
+              </a14:hiddenFill>
+            </a:ext>
+          </a:extLst>
+        </p:spPr>
+      </p:pic>
+      <p:sp>
+        <p:nvSpPr>
+          <p:cNvPr id="38" name="Rectangle 37">
+            <a:extLst>
+              <a:ext uri="{FF2B5EF4-FFF2-40B4-BE49-F238E27FC236}">
+                <a16:creationId xmlns:a16="http://schemas.microsoft.com/office/drawing/2014/main" id="{44BAA8C3-776D-407C-BE5E-6ED15F0E75C9}"/>
+              </a:ext>
+            </a:extLst>
+          </p:cNvPr>
+          <p:cNvSpPr/>
+          <p:nvPr/>
+        </p:nvSpPr>
+        <p:spPr>
+          <a:xfrm>
+            <a:off x="2468034" y="5712048"/>
+            <a:ext cx="711536" cy="767322"/>
+          </a:xfrm>
+          <a:prstGeom prst="rect">
+            <a:avLst/>
+          </a:prstGeom>
+          <a:ln>
+            <a:noFill/>
+          </a:ln>
+          <a:effectLst>
+            <a:outerShdw blurRad="190500" dist="190500" dir="3000000" algn="l" rotWithShape="0">
+              <a:prstClr val="black">
+                <a:alpha val="40000"/>
+              </a:prstClr>
+            </a:outerShdw>
+          </a:effectLst>
+          <a:scene3d>
+            <a:camera prst="orthographicFront"/>
+            <a:lightRig rig="threePt" dir="t"/>
+          </a:scene3d>
+          <a:sp3d>
+            <a:bevelT w="228600" h="69850"/>
+            <a:bevelB w="152400" h="50800" prst="softRound"/>
+          </a:sp3d>
+        </p:spPr>
+        <p:style>
+          <a:lnRef idx="2">
+            <a:schemeClr val="accent1">
+              <a:shade val="50000"/>
+            </a:schemeClr>
+          </a:lnRef>
+          <a:fillRef idx="1">
+            <a:schemeClr val="accent1"/>
+          </a:fillRef>
+          <a:effectRef idx="0">
+            <a:schemeClr val="accent1"/>
+          </a:effectRef>
+          <a:fontRef idx="minor">
+            <a:schemeClr val="lt1"/>
+          </a:fontRef>
+        </p:style>
+        <p:txBody>
+          <a:bodyPr rtlCol="0" anchor="ctr">
+            <a:sp3d>
+              <a:bevelB w="69850" prst="coolSlant"/>
+            </a:sp3d>
+          </a:bodyPr>
+          <a:lstStyle/>
+          <a:p>
+            <a:pPr algn="ctr"/>
+            <a:r>
+              <a:rPr lang="as-IN" sz="4400" b="1" dirty="0">
+                <a:solidFill>
+                  <a:schemeClr val="bg1"/>
+                </a:solidFill>
+                <a:latin typeface="Kalpurush" panose="02000600000000000000" pitchFamily="2" charset="0"/>
+                <a:cs typeface="Kalpurush" panose="02000600000000000000" pitchFamily="2" charset="0"/>
+              </a:rPr>
+              <a:t>দ</a:t>
+            </a:r>
+            <a:endParaRPr lang="en-US" sz="4400" b="1" dirty="0">
+              <a:solidFill>
+                <a:schemeClr val="bg1"/>
+              </a:solidFill>
+              <a:effectLst>
+                <a:outerShdw sx="1000" sy="1000" algn="ctr" rotWithShape="0">
+                  <a:srgbClr val="000000"/>
+                </a:outerShdw>
+              </a:effectLst>
+              <a:latin typeface="Kalpurush" panose="02000600000000000000" pitchFamily="2" charset="0"/>
+              <a:cs typeface="Kalpurush" panose="02000600000000000000" pitchFamily="2" charset="0"/>
+            </a:endParaRPr>
+          </a:p>
+        </p:txBody>
+      </p:sp>
+      <p:pic>
+        <p:nvPicPr>
+          <p:cNvPr id="39" name="Picture 2" descr="Singing bird mascot image | Free SVG">
+            <a:extLst>
+              <a:ext uri="{FF2B5EF4-FFF2-40B4-BE49-F238E27FC236}">
+                <a16:creationId xmlns:a16="http://schemas.microsoft.com/office/drawing/2014/main" id="{186E4B90-DD6B-47D3-932C-A97C5E4BBD58}"/>
+              </a:ext>
+            </a:extLst>
+          </p:cNvPr>
+          <p:cNvPicPr>
+            <a:picLocks noChangeAspect="1" noChangeArrowheads="1"/>
+          </p:cNvPicPr>
+          <p:nvPr/>
+        </p:nvPicPr>
+        <p:blipFill rotWithShape="1">
+          <a:blip r:embed="rId5">
+            <a:extLst>
+              <a:ext uri="{28A0092B-C50C-407E-A947-70E740481C1C}">
+                <a14:useLocalDpi xmlns:a14="http://schemas.microsoft.com/office/drawing/2010/main" val="0"/>
+              </a:ext>
+            </a:extLst>
+          </a:blip>
+          <a:srcRect t="19279" r="43348" b="21728"/>
+          <a:stretch/>
+        </p:blipFill>
+        <p:spPr bwMode="auto">
+          <a:xfrm rot="221702">
+            <a:off x="2232566" y="5121981"/>
+            <a:ext cx="617662" cy="643190"/>
+          </a:xfrm>
+          <a:prstGeom prst="rect">
+            <a:avLst/>
+          </a:prstGeom>
+          <a:noFill/>
+          <a:extLst>
+            <a:ext uri="{909E8E84-426E-40DD-AFC4-6F175D3DCCD1}">
+              <a14:hiddenFill xmlns:a14="http://schemas.microsoft.com/office/drawing/2010/main">
+                <a:solidFill>
+                  <a:srgbClr val="FFFFFF"/>
+                </a:solidFill>
+              </a14:hiddenFill>
+            </a:ext>
+          </a:extLst>
+        </p:spPr>
+      </p:pic>
+      <p:sp>
+        <p:nvSpPr>
+          <p:cNvPr id="42" name="Rectangle 41">
+            <a:extLst>
+              <a:ext uri="{FF2B5EF4-FFF2-40B4-BE49-F238E27FC236}">
+                <a16:creationId xmlns:a16="http://schemas.microsoft.com/office/drawing/2014/main" id="{95AC274D-0D44-43E0-9FBB-6C6A45AFAA26}"/>
+              </a:ext>
+            </a:extLst>
+          </p:cNvPr>
+          <p:cNvSpPr/>
+          <p:nvPr/>
+        </p:nvSpPr>
+        <p:spPr>
+          <a:xfrm>
+            <a:off x="8272302" y="4425376"/>
+            <a:ext cx="711536" cy="767322"/>
+          </a:xfrm>
+          <a:prstGeom prst="rect">
+            <a:avLst/>
+          </a:prstGeom>
+          <a:ln>
+            <a:noFill/>
+          </a:ln>
+          <a:effectLst>
+            <a:outerShdw blurRad="190500" dist="190500" dir="3000000" algn="l" rotWithShape="0">
+              <a:prstClr val="black">
+                <a:alpha val="40000"/>
+              </a:prstClr>
+            </a:outerShdw>
+          </a:effectLst>
+          <a:scene3d>
+            <a:camera prst="orthographicFront"/>
+            <a:lightRig rig="threePt" dir="t"/>
+          </a:scene3d>
+          <a:sp3d>
+            <a:bevelT w="228600" h="69850"/>
+            <a:bevelB w="152400" h="50800" prst="softRound"/>
+          </a:sp3d>
+        </p:spPr>
+        <p:style>
+          <a:lnRef idx="2">
+            <a:schemeClr val="accent1">
+              <a:shade val="50000"/>
+            </a:schemeClr>
+          </a:lnRef>
+          <a:fillRef idx="1">
+            <a:schemeClr val="accent1"/>
+          </a:fillRef>
+          <a:effectRef idx="0">
+            <a:schemeClr val="accent1"/>
+          </a:effectRef>
+          <a:fontRef idx="minor">
+            <a:schemeClr val="lt1"/>
+          </a:fontRef>
+        </p:style>
+        <p:txBody>
+          <a:bodyPr rtlCol="0" anchor="ctr">
+            <a:sp3d>
+              <a:bevelB w="69850" prst="coolSlant"/>
+            </a:sp3d>
+          </a:bodyPr>
+          <a:lstStyle/>
+          <a:p>
+            <a:pPr algn="ctr"/>
+            <a:r>
+              <a:rPr lang="as-IN" sz="4400" b="1" dirty="0">
+                <a:solidFill>
+                  <a:schemeClr val="bg1"/>
+                </a:solidFill>
+                <a:latin typeface="Kalpurush" panose="02000600000000000000" pitchFamily="2" charset="0"/>
+                <a:cs typeface="Kalpurush" panose="02000600000000000000" pitchFamily="2" charset="0"/>
+              </a:rPr>
+              <a:t>দ</a:t>
+            </a:r>
+            <a:endParaRPr lang="en-US" sz="4400" b="1" dirty="0">
+              <a:solidFill>
+                <a:schemeClr val="bg1"/>
+              </a:solidFill>
+              <a:effectLst>
+                <a:outerShdw sx="1000" sy="1000" algn="ctr" rotWithShape="0">
+                  <a:srgbClr val="000000"/>
+                </a:outerShdw>
+              </a:effectLst>
+              <a:latin typeface="Kalpurush" panose="02000600000000000000" pitchFamily="2" charset="0"/>
+              <a:cs typeface="Kalpurush" panose="02000600000000000000" pitchFamily="2" charset="0"/>
+            </a:endParaRPr>
+          </a:p>
+        </p:txBody>
+      </p:sp>
+      <p:pic>
+        <p:nvPicPr>
+          <p:cNvPr id="43" name="Picture 6" descr="Free photo Writing School Pencil Jumping Author Happy Learn - Max Pixel">
+            <a:extLst>
+              <a:ext uri="{FF2B5EF4-FFF2-40B4-BE49-F238E27FC236}">
+                <a16:creationId xmlns:a16="http://schemas.microsoft.com/office/drawing/2014/main" id="{EEE3B12D-1321-40A6-BE2B-8F3345C7AF70}"/>
+              </a:ext>
+            </a:extLst>
+          </p:cNvPr>
+          <p:cNvPicPr>
+            <a:picLocks noChangeAspect="1" noChangeArrowheads="1"/>
+          </p:cNvPicPr>
+          <p:nvPr/>
+        </p:nvPicPr>
+        <p:blipFill>
+          <a:blip r:embed="rId4">
+            <a:extLst>
+              <a:ext uri="{28A0092B-C50C-407E-A947-70E740481C1C}">
+                <a14:useLocalDpi xmlns:a14="http://schemas.microsoft.com/office/drawing/2010/main" val="0"/>
+              </a:ext>
+            </a:extLst>
+          </a:blip>
+          <a:srcRect/>
+          <a:stretch>
+            <a:fillRect/>
+          </a:stretch>
+        </p:blipFill>
+        <p:spPr bwMode="auto">
+          <a:xfrm rot="1596075">
+            <a:off x="8749805" y="3654848"/>
+            <a:ext cx="565506" cy="885140"/>
+          </a:xfrm>
+          <a:prstGeom prst="rect">
+            <a:avLst/>
+          </a:prstGeom>
+          <a:noFill/>
+          <a:extLst>
+            <a:ext uri="{909E8E84-426E-40DD-AFC4-6F175D3DCCD1}">
+              <a14:hiddenFill xmlns:a14="http://schemas.microsoft.com/office/drawing/2010/main">
+                <a:solidFill>
+                  <a:srgbClr val="FFFFFF"/>
+                </a:solidFill>
+              </a14:hiddenFill>
+            </a:ext>
+          </a:extLst>
+        </p:spPr>
+      </p:pic>
+      <p:sp>
+        <p:nvSpPr>
+          <p:cNvPr id="44" name="Rectangle 43">
+            <a:extLst>
+              <a:ext uri="{FF2B5EF4-FFF2-40B4-BE49-F238E27FC236}">
+                <a16:creationId xmlns:a16="http://schemas.microsoft.com/office/drawing/2014/main" id="{3B6C1463-BF91-414C-BCBD-D349E88AA520}"/>
+              </a:ext>
+            </a:extLst>
+          </p:cNvPr>
+          <p:cNvSpPr/>
+          <p:nvPr/>
+        </p:nvSpPr>
+        <p:spPr>
+          <a:xfrm>
+            <a:off x="10840610" y="2457237"/>
+            <a:ext cx="711536" cy="767322"/>
+          </a:xfrm>
+          <a:prstGeom prst="rect">
+            <a:avLst/>
+          </a:prstGeom>
+          <a:ln>
+            <a:noFill/>
+          </a:ln>
+          <a:effectLst>
+            <a:outerShdw blurRad="190500" dist="190500" dir="3000000" algn="l" rotWithShape="0">
+              <a:prstClr val="black">
+                <a:alpha val="40000"/>
+              </a:prstClr>
+            </a:outerShdw>
+          </a:effectLst>
+          <a:scene3d>
+            <a:camera prst="orthographicFront"/>
+            <a:lightRig rig="threePt" dir="t"/>
+          </a:scene3d>
+          <a:sp3d>
+            <a:bevelT w="228600" h="69850"/>
+            <a:bevelB w="152400" h="50800" prst="softRound"/>
+          </a:sp3d>
+        </p:spPr>
+        <p:style>
+          <a:lnRef idx="2">
+            <a:schemeClr val="accent1">
+              <a:shade val="50000"/>
+            </a:schemeClr>
+          </a:lnRef>
+          <a:fillRef idx="1">
+            <a:schemeClr val="accent1"/>
+          </a:fillRef>
+          <a:effectRef idx="0">
+            <a:schemeClr val="accent1"/>
+          </a:effectRef>
+          <a:fontRef idx="minor">
+            <a:schemeClr val="lt1"/>
+          </a:fontRef>
+        </p:style>
+        <p:txBody>
+          <a:bodyPr rtlCol="0" anchor="ctr">
+            <a:sp3d>
+              <a:bevelB w="69850" prst="coolSlant"/>
+            </a:sp3d>
+          </a:bodyPr>
+          <a:lstStyle/>
+          <a:p>
+            <a:pPr algn="ctr"/>
+            <a:r>
+              <a:rPr lang="bn-IN" sz="4400" b="1" dirty="0">
+                <a:solidFill>
+                  <a:schemeClr val="bg1"/>
+                </a:solidFill>
+                <a:latin typeface="Kalpurush" panose="02000600000000000000" pitchFamily="2" charset="0"/>
+                <a:cs typeface="Kalpurush" panose="02000600000000000000" pitchFamily="2" charset="0"/>
+              </a:rPr>
+              <a:t>ঘ</a:t>
+            </a:r>
+            <a:endParaRPr lang="en-US" sz="4400" b="1" dirty="0">
+              <a:solidFill>
+                <a:schemeClr val="bg1"/>
+              </a:solidFill>
+              <a:effectLst>
+                <a:outerShdw sx="1000" sy="1000" algn="ctr" rotWithShape="0">
+                  <a:srgbClr val="000000"/>
+                </a:outerShdw>
+              </a:effectLst>
+              <a:latin typeface="Kalpurush" panose="02000600000000000000" pitchFamily="2" charset="0"/>
+              <a:cs typeface="Kalpurush" panose="02000600000000000000" pitchFamily="2" charset="0"/>
+            </a:endParaRPr>
+          </a:p>
+        </p:txBody>
+      </p:sp>
+      <p:pic>
+        <p:nvPicPr>
+          <p:cNvPr id="45" name="Picture 6" descr="Free photo Writing School Pencil Jumping Author Happy Learn - Max Pixel">
+            <a:extLst>
+              <a:ext uri="{FF2B5EF4-FFF2-40B4-BE49-F238E27FC236}">
+                <a16:creationId xmlns:a16="http://schemas.microsoft.com/office/drawing/2014/main" id="{E8979F4E-E355-4B3A-86CB-F750FB0F6541}"/>
+              </a:ext>
+            </a:extLst>
+          </p:cNvPr>
+          <p:cNvPicPr>
+            <a:picLocks noChangeAspect="1" noChangeArrowheads="1"/>
+          </p:cNvPicPr>
+          <p:nvPr/>
+        </p:nvPicPr>
+        <p:blipFill>
+          <a:blip r:embed="rId4">
+            <a:extLst>
+              <a:ext uri="{28A0092B-C50C-407E-A947-70E740481C1C}">
+                <a14:useLocalDpi xmlns:a14="http://schemas.microsoft.com/office/drawing/2010/main" val="0"/>
+              </a:ext>
+            </a:extLst>
+          </a:blip>
+          <a:srcRect/>
+          <a:stretch>
+            <a:fillRect/>
+          </a:stretch>
+        </p:blipFill>
+        <p:spPr bwMode="auto">
+          <a:xfrm rot="1596075">
+            <a:off x="11318113" y="1686709"/>
+            <a:ext cx="565506" cy="885140"/>
+          </a:xfrm>
+          <a:prstGeom prst="rect">
+            <a:avLst/>
+          </a:prstGeom>
+          <a:noFill/>
+          <a:extLst>
+            <a:ext uri="{909E8E84-426E-40DD-AFC4-6F175D3DCCD1}">
+              <a14:hiddenFill xmlns:a14="http://schemas.microsoft.com/office/drawing/2010/main">
+                <a:solidFill>
+                  <a:srgbClr val="FFFFFF"/>
+                </a:solidFill>
+              </a14:hiddenFill>
+            </a:ext>
+          </a:extLst>
+        </p:spPr>
+      </p:pic>
+      <p:sp>
+        <p:nvSpPr>
+          <p:cNvPr id="46" name="Rectangle 45">
+            <a:extLst>
+              <a:ext uri="{FF2B5EF4-FFF2-40B4-BE49-F238E27FC236}">
+                <a16:creationId xmlns:a16="http://schemas.microsoft.com/office/drawing/2014/main" id="{D39D9378-E061-4F6F-8D94-ADE58DB20DFC}"/>
+              </a:ext>
+            </a:extLst>
+          </p:cNvPr>
+          <p:cNvSpPr/>
+          <p:nvPr/>
+        </p:nvSpPr>
+        <p:spPr>
+          <a:xfrm>
+            <a:off x="10404301" y="4588814"/>
+            <a:ext cx="711536" cy="767322"/>
+          </a:xfrm>
+          <a:prstGeom prst="rect">
+            <a:avLst/>
+          </a:prstGeom>
+          <a:ln>
+            <a:noFill/>
+          </a:ln>
+          <a:effectLst>
+            <a:outerShdw blurRad="190500" dist="190500" dir="3000000" algn="l" rotWithShape="0">
+              <a:prstClr val="black">
+                <a:alpha val="40000"/>
+              </a:prstClr>
+            </a:outerShdw>
+          </a:effectLst>
+          <a:scene3d>
+            <a:camera prst="orthographicFront"/>
+            <a:lightRig rig="threePt" dir="t"/>
+          </a:scene3d>
+          <a:sp3d>
+            <a:bevelT w="228600" h="69850"/>
+            <a:bevelB w="152400" h="50800" prst="softRound"/>
+          </a:sp3d>
+        </p:spPr>
+        <p:style>
+          <a:lnRef idx="2">
+            <a:schemeClr val="accent1">
+              <a:shade val="50000"/>
+            </a:schemeClr>
+          </a:lnRef>
+          <a:fillRef idx="1">
+            <a:schemeClr val="accent1"/>
+          </a:fillRef>
+          <a:effectRef idx="0">
+            <a:schemeClr val="accent1"/>
+          </a:effectRef>
+          <a:fontRef idx="minor">
+            <a:schemeClr val="lt1"/>
+          </a:fontRef>
+        </p:style>
+        <p:txBody>
+          <a:bodyPr rtlCol="0" anchor="ctr">
+            <a:sp3d>
+              <a:bevelB w="69850" prst="coolSlant"/>
+            </a:sp3d>
+          </a:bodyPr>
+          <a:lstStyle/>
+          <a:p>
+            <a:pPr algn="ctr"/>
+            <a:r>
+              <a:rPr lang="as-IN" sz="4400" b="1" dirty="0">
+                <a:solidFill>
+                  <a:schemeClr val="bg1"/>
+                </a:solidFill>
+                <a:latin typeface="Kalpurush" panose="02000600000000000000" pitchFamily="2" charset="0"/>
+                <a:cs typeface="Kalpurush" panose="02000600000000000000" pitchFamily="2" charset="0"/>
+              </a:rPr>
+              <a:t>ৎ</a:t>
+            </a:r>
+            <a:endParaRPr lang="en-US" sz="4400" b="1" dirty="0">
+              <a:solidFill>
+                <a:schemeClr val="bg1"/>
+              </a:solidFill>
+              <a:effectLst>
+                <a:outerShdw sx="1000" sy="1000" algn="ctr" rotWithShape="0">
+                  <a:srgbClr val="000000"/>
+                </a:outerShdw>
+              </a:effectLst>
+              <a:latin typeface="Kalpurush" panose="02000600000000000000" pitchFamily="2" charset="0"/>
+              <a:cs typeface="Kalpurush" panose="02000600000000000000" pitchFamily="2" charset="0"/>
+            </a:endParaRPr>
+          </a:p>
+        </p:txBody>
+      </p:sp>
+      <p:pic>
+        <p:nvPicPr>
+          <p:cNvPr id="47" name="Picture 6" descr="Free photo Writing School Pencil Jumping Author Happy Learn - Max Pixel">
+            <a:extLst>
+              <a:ext uri="{FF2B5EF4-FFF2-40B4-BE49-F238E27FC236}">
+                <a16:creationId xmlns:a16="http://schemas.microsoft.com/office/drawing/2014/main" id="{B0D1B84A-5AD9-4F91-8E3C-EC572620FA21}"/>
+              </a:ext>
+            </a:extLst>
+          </p:cNvPr>
+          <p:cNvPicPr>
+            <a:picLocks noChangeAspect="1" noChangeArrowheads="1"/>
+          </p:cNvPicPr>
+          <p:nvPr/>
+        </p:nvPicPr>
+        <p:blipFill>
+          <a:blip r:embed="rId4">
+            <a:extLst>
+              <a:ext uri="{28A0092B-C50C-407E-A947-70E740481C1C}">
+                <a14:useLocalDpi xmlns:a14="http://schemas.microsoft.com/office/drawing/2010/main" val="0"/>
+              </a:ext>
+            </a:extLst>
+          </a:blip>
+          <a:srcRect/>
+          <a:stretch>
+            <a:fillRect/>
+          </a:stretch>
+        </p:blipFill>
+        <p:spPr bwMode="auto">
+          <a:xfrm rot="1596075">
+            <a:off x="10881804" y="3818286"/>
+            <a:ext cx="565506" cy="885140"/>
+          </a:xfrm>
+          <a:prstGeom prst="rect">
+            <a:avLst/>
+          </a:prstGeom>
+          <a:noFill/>
+          <a:extLst>
+            <a:ext uri="{909E8E84-426E-40DD-AFC4-6F175D3DCCD1}">
+              <a14:hiddenFill xmlns:a14="http://schemas.microsoft.com/office/drawing/2010/main">
+                <a:solidFill>
+                  <a:srgbClr val="FFFFFF"/>
+                </a:solidFill>
+              </a14:hiddenFill>
+            </a:ext>
+          </a:extLst>
+        </p:spPr>
+      </p:pic>
+      <p:sp>
+        <p:nvSpPr>
+          <p:cNvPr id="48" name="Rectangle 47">
+            <a:extLst>
+              <a:ext uri="{FF2B5EF4-FFF2-40B4-BE49-F238E27FC236}">
+                <a16:creationId xmlns:a16="http://schemas.microsoft.com/office/drawing/2014/main" id="{D17DFAF8-912D-40FF-9DD1-99BA3A0C24AB}"/>
+              </a:ext>
+            </a:extLst>
+          </p:cNvPr>
+          <p:cNvSpPr/>
+          <p:nvPr/>
+        </p:nvSpPr>
+        <p:spPr>
+          <a:xfrm>
+            <a:off x="6113123" y="3575085"/>
+            <a:ext cx="711536" cy="767322"/>
+          </a:xfrm>
+          <a:prstGeom prst="rect">
+            <a:avLst/>
+          </a:prstGeom>
+          <a:ln>
+            <a:noFill/>
+          </a:ln>
+          <a:effectLst>
+            <a:outerShdw blurRad="190500" dist="190500" dir="3000000" algn="l" rotWithShape="0">
+              <a:prstClr val="black">
+                <a:alpha val="40000"/>
+              </a:prstClr>
+            </a:outerShdw>
+          </a:effectLst>
+          <a:scene3d>
+            <a:camera prst="orthographicFront"/>
+            <a:lightRig rig="threePt" dir="t"/>
+          </a:scene3d>
+          <a:sp3d>
+            <a:bevelT w="228600" h="69850"/>
+            <a:bevelB w="152400" h="50800" prst="softRound"/>
+          </a:sp3d>
+        </p:spPr>
+        <p:style>
+          <a:lnRef idx="2">
+            <a:schemeClr val="accent1">
+              <a:shade val="50000"/>
+            </a:schemeClr>
+          </a:lnRef>
+          <a:fillRef idx="1">
+            <a:schemeClr val="accent1"/>
+          </a:fillRef>
+          <a:effectRef idx="0">
+            <a:schemeClr val="accent1"/>
+          </a:effectRef>
+          <a:fontRef idx="minor">
+            <a:schemeClr val="lt1"/>
+          </a:fontRef>
+        </p:style>
+        <p:txBody>
+          <a:bodyPr rtlCol="0" anchor="ctr">
+            <a:sp3d>
+              <a:bevelB w="69850" prst="coolSlant"/>
+            </a:sp3d>
+          </a:bodyPr>
+          <a:lstStyle/>
+          <a:p>
+            <a:pPr algn="ctr"/>
+            <a:r>
+              <a:rPr lang="bn-IN" sz="4400" b="1" dirty="0">
+                <a:solidFill>
+                  <a:schemeClr val="bg1"/>
+                </a:solidFill>
+                <a:latin typeface="Kalpurush" panose="02000600000000000000" pitchFamily="2" charset="0"/>
+                <a:cs typeface="Kalpurush" panose="02000600000000000000" pitchFamily="2" charset="0"/>
+              </a:rPr>
+              <a:t>ড়</a:t>
+            </a:r>
+            <a:endParaRPr lang="en-US" sz="4400" b="1" dirty="0">
+              <a:solidFill>
+                <a:schemeClr val="bg1"/>
+              </a:solidFill>
+              <a:effectLst>
+                <a:outerShdw sx="1000" sy="1000" algn="ctr" rotWithShape="0">
+                  <a:srgbClr val="000000"/>
+                </a:outerShdw>
+              </a:effectLst>
+              <a:latin typeface="Kalpurush" panose="02000600000000000000" pitchFamily="2" charset="0"/>
+              <a:cs typeface="Kalpurush" panose="02000600000000000000" pitchFamily="2" charset="0"/>
+            </a:endParaRPr>
+          </a:p>
+        </p:txBody>
+      </p:sp>
+      <p:pic>
+        <p:nvPicPr>
+          <p:cNvPr id="49" name="Picture 6" descr="Free photo Writing School Pencil Jumping Author Happy Learn - Max Pixel">
+            <a:extLst>
+              <a:ext uri="{FF2B5EF4-FFF2-40B4-BE49-F238E27FC236}">
+                <a16:creationId xmlns:a16="http://schemas.microsoft.com/office/drawing/2014/main" id="{AD600054-D40F-4A17-9928-4862D23895AD}"/>
+              </a:ext>
+            </a:extLst>
+          </p:cNvPr>
+          <p:cNvPicPr>
+            <a:picLocks noChangeAspect="1" noChangeArrowheads="1"/>
+          </p:cNvPicPr>
+          <p:nvPr/>
+        </p:nvPicPr>
+        <p:blipFill>
+          <a:blip r:embed="rId4">
+            <a:extLst>
+              <a:ext uri="{28A0092B-C50C-407E-A947-70E740481C1C}">
+                <a14:useLocalDpi xmlns:a14="http://schemas.microsoft.com/office/drawing/2010/main" val="0"/>
+              </a:ext>
+            </a:extLst>
+          </a:blip>
+          <a:srcRect/>
+          <a:stretch>
+            <a:fillRect/>
+          </a:stretch>
+        </p:blipFill>
+        <p:spPr bwMode="auto">
+          <a:xfrm rot="1596075">
+            <a:off x="6590626" y="2804557"/>
+            <a:ext cx="565506" cy="885140"/>
+          </a:xfrm>
+          <a:prstGeom prst="rect">
+            <a:avLst/>
+          </a:prstGeom>
+          <a:noFill/>
+          <a:extLst>
+            <a:ext uri="{909E8E84-426E-40DD-AFC4-6F175D3DCCD1}">
+              <a14:hiddenFill xmlns:a14="http://schemas.microsoft.com/office/drawing/2010/main">
+                <a:solidFill>
+                  <a:srgbClr val="FFFFFF"/>
+                </a:solidFill>
+              </a14:hiddenFill>
+            </a:ext>
+          </a:extLst>
+        </p:spPr>
+      </p:pic>
+      <p:sp>
+        <p:nvSpPr>
+          <p:cNvPr id="50" name="Rectangle 49">
+            <a:extLst>
+              <a:ext uri="{FF2B5EF4-FFF2-40B4-BE49-F238E27FC236}">
+                <a16:creationId xmlns:a16="http://schemas.microsoft.com/office/drawing/2014/main" id="{CEE574DA-EEAD-4912-9C07-A2D30EDD97A1}"/>
+              </a:ext>
+            </a:extLst>
+          </p:cNvPr>
+          <p:cNvSpPr/>
+          <p:nvPr/>
+        </p:nvSpPr>
+        <p:spPr>
+          <a:xfrm>
+            <a:off x="7910665" y="1950343"/>
+            <a:ext cx="711536" cy="767322"/>
+          </a:xfrm>
+          <a:prstGeom prst="rect">
+            <a:avLst/>
+          </a:prstGeom>
+          <a:ln>
+            <a:noFill/>
+          </a:ln>
+          <a:effectLst>
+            <a:outerShdw blurRad="190500" dist="190500" dir="3000000" algn="l" rotWithShape="0">
+              <a:prstClr val="black">
+                <a:alpha val="40000"/>
+              </a:prstClr>
+            </a:outerShdw>
+          </a:effectLst>
+          <a:scene3d>
+            <a:camera prst="orthographicFront"/>
+            <a:lightRig rig="threePt" dir="t"/>
+          </a:scene3d>
+          <a:sp3d>
+            <a:bevelT w="228600" h="69850"/>
+            <a:bevelB w="152400" h="50800" prst="softRound"/>
+          </a:sp3d>
+        </p:spPr>
+        <p:style>
+          <a:lnRef idx="2">
+            <a:schemeClr val="accent1">
+              <a:shade val="50000"/>
+            </a:schemeClr>
+          </a:lnRef>
+          <a:fillRef idx="1">
+            <a:schemeClr val="accent1"/>
+          </a:fillRef>
+          <a:effectRef idx="0">
+            <a:schemeClr val="accent1"/>
+          </a:effectRef>
+          <a:fontRef idx="minor">
+            <a:schemeClr val="lt1"/>
+          </a:fontRef>
+        </p:style>
+        <p:txBody>
+          <a:bodyPr rtlCol="0" anchor="ctr">
+            <a:sp3d>
+              <a:bevelB w="69850" prst="coolSlant"/>
+            </a:sp3d>
+          </a:bodyPr>
+          <a:lstStyle/>
+          <a:p>
+            <a:pPr algn="ctr"/>
+            <a:r>
+              <a:rPr lang="bn-IN" sz="4400" b="1" dirty="0">
+                <a:solidFill>
+                  <a:schemeClr val="bg1"/>
+                </a:solidFill>
+                <a:latin typeface="Kalpurush" panose="02000600000000000000" pitchFamily="2" charset="0"/>
+                <a:cs typeface="Kalpurush" panose="02000600000000000000" pitchFamily="2" charset="0"/>
+              </a:rPr>
+              <a:t>ঠ</a:t>
+            </a:r>
+            <a:endParaRPr lang="en-US" sz="4400" b="1" dirty="0">
+              <a:solidFill>
+                <a:schemeClr val="bg1"/>
+              </a:solidFill>
+              <a:effectLst>
+                <a:outerShdw sx="1000" sy="1000" algn="ctr" rotWithShape="0">
+                  <a:srgbClr val="000000"/>
+                </a:outerShdw>
+              </a:effectLst>
+              <a:latin typeface="Kalpurush" panose="02000600000000000000" pitchFamily="2" charset="0"/>
+              <a:cs typeface="Kalpurush" panose="02000600000000000000" pitchFamily="2" charset="0"/>
+            </a:endParaRPr>
+          </a:p>
+        </p:txBody>
+      </p:sp>
+      <p:pic>
+        <p:nvPicPr>
+          <p:cNvPr id="51" name="Picture 6" descr="Free photo Writing School Pencil Jumping Author Happy Learn - Max Pixel">
+            <a:extLst>
+              <a:ext uri="{FF2B5EF4-FFF2-40B4-BE49-F238E27FC236}">
+                <a16:creationId xmlns:a16="http://schemas.microsoft.com/office/drawing/2014/main" id="{F02E504A-381B-483F-AE8A-B22378DF3218}"/>
+              </a:ext>
+            </a:extLst>
+          </p:cNvPr>
+          <p:cNvPicPr>
+            <a:picLocks noChangeAspect="1" noChangeArrowheads="1"/>
+          </p:cNvPicPr>
+          <p:nvPr/>
+        </p:nvPicPr>
+        <p:blipFill>
+          <a:blip r:embed="rId4">
+            <a:extLst>
+              <a:ext uri="{28A0092B-C50C-407E-A947-70E740481C1C}">
+                <a14:useLocalDpi xmlns:a14="http://schemas.microsoft.com/office/drawing/2010/main" val="0"/>
+              </a:ext>
+            </a:extLst>
+          </a:blip>
+          <a:srcRect/>
+          <a:stretch>
+            <a:fillRect/>
+          </a:stretch>
+        </p:blipFill>
+        <p:spPr bwMode="auto">
+          <a:xfrm rot="1596075">
+            <a:off x="8388168" y="1179815"/>
+            <a:ext cx="565506" cy="885140"/>
           </a:xfrm>
           <a:prstGeom prst="rect">
             <a:avLst/>
@@ -19719,28 +20953,6 @@
   <p:clrMapOvr>
     <a:masterClrMapping/>
   </p:clrMapOvr>
-  <p:timing>
-    <p:tnLst>
-      <p:par>
-        <p:cTn id="1" dur="indefinite" restart="never" nodeType="tmRoot">
-          <p:childTnLst>
-            <p:video>
-              <p:cMediaNode vol="80000">
-                <p:cTn id="2" fill="hold" display="0">
-                  <p:stCondLst>
-                    <p:cond delay="indefinite"/>
-                  </p:stCondLst>
-                </p:cTn>
-                <p:tgtEl>
-                  <p:spTgt spid="13"/>
-                </p:tgtEl>
-              </p:cMediaNode>
-            </p:video>
-          </p:childTnLst>
-        </p:cTn>
-      </p:par>
-    </p:tnLst>
-  </p:timing>
 </p:sld>
 </file>
 

</xml_diff>